<commit_message>
Touch code and lesson fixed
</commit_message>
<xml_diff>
--- a/translations/en-us/beginner/Touch.pptx
+++ b/translations/en-us/beginner/Touch.pptx
@@ -5,10 +5,10 @@
     <p:sldMasterId id="2147483714" r:id="rId1"/>
   </p:sldMasterIdLst>
   <p:notesMasterIdLst>
-    <p:notesMasterId r:id="rId16"/>
+    <p:notesMasterId r:id="rId15"/>
   </p:notesMasterIdLst>
   <p:handoutMasterIdLst>
-    <p:handoutMasterId r:id="rId17"/>
+    <p:handoutMasterId r:id="rId16"/>
   </p:handoutMasterIdLst>
   <p:sldIdLst>
     <p:sldId id="410" r:id="rId2"/>
@@ -17,14 +17,13 @@
     <p:sldId id="414" r:id="rId5"/>
     <p:sldId id="419" r:id="rId6"/>
     <p:sldId id="327" r:id="rId7"/>
-    <p:sldId id="418" r:id="rId8"/>
-    <p:sldId id="420" r:id="rId9"/>
-    <p:sldId id="267" r:id="rId10"/>
-    <p:sldId id="412" r:id="rId11"/>
-    <p:sldId id="421" r:id="rId12"/>
-    <p:sldId id="413" r:id="rId13"/>
-    <p:sldId id="422" r:id="rId14"/>
-    <p:sldId id="409" r:id="rId15"/>
+    <p:sldId id="424" r:id="rId8"/>
+    <p:sldId id="267" r:id="rId9"/>
+    <p:sldId id="412" r:id="rId10"/>
+    <p:sldId id="421" r:id="rId11"/>
+    <p:sldId id="413" r:id="rId12"/>
+    <p:sldId id="422" r:id="rId13"/>
+    <p:sldId id="409" r:id="rId14"/>
   </p:sldIdLst>
   <p:sldSz cx="9144000" cy="6858000" type="screen4x3"/>
   <p:notesSz cx="6858000" cy="9144000"/>
@@ -224,7 +223,7 @@
           <a:p>
             <a:fld id="{F8D9B3D7-15CB-9343-AA49-EFB5A8F33F18}" type="datetimeFigureOut">
               <a:rPr lang="en-US" smtClean="0"/>
-              <a:t>2/28/2015</a:t>
+              <a:t>11/1/15</a:t>
             </a:fld>
             <a:endParaRPr lang="en-US"/>
           </a:p>
@@ -390,7 +389,7 @@
           <a:p>
             <a:fld id="{FD3EFF1E-85A1-6640-AFB9-C38833E80A84}" type="datetimeFigureOut">
               <a:rPr lang="en-US" smtClean="0"/>
-              <a:t>2/28/2015</a:t>
+              <a:t>11/1/15</a:t>
             </a:fld>
             <a:endParaRPr lang="en-US"/>
           </a:p>
@@ -827,6 +826,90 @@
 </p:notes>
 </file>
 
+<file path=ppt/notesSlides/notesSlide3.xml><?xml version="1.0" encoding="utf-8"?>
+<p:notes xmlns:a="http://schemas.openxmlformats.org/drawingml/2006/main" xmlns:r="http://schemas.openxmlformats.org/officeDocument/2006/relationships" xmlns:p="http://schemas.openxmlformats.org/presentationml/2006/main">
+  <p:cSld>
+    <p:spTree>
+      <p:nvGrpSpPr>
+        <p:cNvPr id="1" name=""/>
+        <p:cNvGrpSpPr/>
+        <p:nvPr/>
+      </p:nvGrpSpPr>
+      <p:grpSpPr>
+        <a:xfrm>
+          <a:off x="0" y="0"/>
+          <a:ext cx="0" cy="0"/>
+          <a:chOff x="0" y="0"/>
+          <a:chExt cx="0" cy="0"/>
+        </a:xfrm>
+      </p:grpSpPr>
+      <p:sp>
+        <p:nvSpPr>
+          <p:cNvPr id="2" name="Slide Image Placeholder 1"/>
+          <p:cNvSpPr>
+            <a:spLocks noGrp="1" noRot="1" noChangeAspect="1"/>
+          </p:cNvSpPr>
+          <p:nvPr>
+            <p:ph type="sldImg"/>
+          </p:nvPr>
+        </p:nvSpPr>
+        <p:spPr/>
+      </p:sp>
+      <p:sp>
+        <p:nvSpPr>
+          <p:cNvPr id="3" name="Notes Placeholder 2"/>
+          <p:cNvSpPr>
+            <a:spLocks noGrp="1"/>
+          </p:cNvSpPr>
+          <p:nvPr>
+            <p:ph type="body" idx="1"/>
+          </p:nvPr>
+        </p:nvSpPr>
+        <p:spPr/>
+        <p:txBody>
+          <a:bodyPr/>
+          <a:lstStyle/>
+          <a:p>
+            <a:endParaRPr lang="en-US"/>
+          </a:p>
+        </p:txBody>
+      </p:sp>
+      <p:sp>
+        <p:nvSpPr>
+          <p:cNvPr id="4" name="Slide Number Placeholder 3"/>
+          <p:cNvSpPr>
+            <a:spLocks noGrp="1"/>
+          </p:cNvSpPr>
+          <p:nvPr>
+            <p:ph type="sldNum" sz="quarter" idx="10"/>
+          </p:nvPr>
+        </p:nvSpPr>
+        <p:spPr/>
+        <p:txBody>
+          <a:bodyPr/>
+          <a:lstStyle/>
+          <a:p>
+            <a:fld id="{13967457-1E83-1040-AFF7-8D09C473DBD5}" type="slidenum">
+              <a:rPr lang="en-US" smtClean="0"/>
+              <a:t>10</a:t>
+            </a:fld>
+            <a:endParaRPr lang="en-US"/>
+          </a:p>
+        </p:txBody>
+      </p:sp>
+    </p:spTree>
+    <p:extLst>
+      <p:ext uri="{BB962C8B-B14F-4D97-AF65-F5344CB8AC3E}">
+        <p14:creationId xmlns:p14="http://schemas.microsoft.com/office/powerpoint/2010/main" val="1137836655"/>
+      </p:ext>
+    </p:extLst>
+  </p:cSld>
+  <p:clrMapOvr>
+    <a:masterClrMapping/>
+  </p:clrMapOvr>
+</p:notes>
+</file>
+
 <file path=ppt/slideLayouts/slideLayout1.xml><?xml version="1.0" encoding="utf-8"?>
 <p:sldLayout xmlns:a="http://schemas.openxmlformats.org/drawingml/2006/main" xmlns:r="http://schemas.openxmlformats.org/officeDocument/2006/relationships" xmlns:p="http://schemas.openxmlformats.org/presentationml/2006/main" showMasterSp="0" type="title" preserve="1">
   <p:cSld name="Title Slide">
@@ -1018,9 +1101,9 @@
           <a:bodyPr/>
           <a:lstStyle/>
           <a:p>
-            <a:fld id="{EE63EBD1-BF19-4577-AA50-8FDC66D4ABDA}" type="datetime1">
-              <a:rPr lang="en-US" smtClean="0"/>
-              <a:t>2/28/2015</a:t>
+            <a:fld id="{684F1F4F-7B22-E44C-8CD7-97B626D1700D}" type="datetime1">
+              <a:rPr lang="en-US" smtClean="0"/>
+              <a:t>11/1/15</a:t>
             </a:fld>
             <a:endParaRPr lang="en-US"/>
           </a:p>
@@ -1043,7 +1126,7 @@
           <a:p>
             <a:r>
               <a:rPr lang="en-US" smtClean="0"/>
-              <a:t>© EV3Lessons.com, 2015, (Last edit: 2/26/15)</a:t>
+              <a:t>© EV3Lessons.com, 2015, (Last edit: 11/01/15)</a:t>
             </a:r>
             <a:endParaRPr lang="en-US"/>
           </a:p>
@@ -1316,9 +1399,9 @@
           <a:bodyPr/>
           <a:lstStyle/>
           <a:p>
-            <a:fld id="{6345C841-BA90-48FC-9CA6-BD42511D5843}" type="datetime1">
-              <a:rPr lang="en-US" smtClean="0"/>
-              <a:t>2/28/2015</a:t>
+            <a:fld id="{3690C949-6CD6-E849-99AE-792EC6F94E3F}" type="datetime1">
+              <a:rPr lang="en-US" smtClean="0"/>
+              <a:t>11/1/15</a:t>
             </a:fld>
             <a:endParaRPr lang="en-US"/>
           </a:p>
@@ -1341,7 +1424,7 @@
           <a:p>
             <a:r>
               <a:rPr lang="en-US" smtClean="0"/>
-              <a:t>© EV3Lessons.com, 2015, (Last edit: 2/26/15)</a:t>
+              <a:t>© EV3Lessons.com, 2015, (Last edit: 11/01/15)</a:t>
             </a:r>
             <a:endParaRPr lang="en-US"/>
           </a:p>
@@ -1495,9 +1578,9 @@
           <a:bodyPr/>
           <a:lstStyle/>
           <a:p>
-            <a:fld id="{966C623B-D2F7-4F4D-BEAB-DF4DB430E817}" type="datetime1">
-              <a:rPr lang="en-US" smtClean="0"/>
-              <a:t>2/28/2015</a:t>
+            <a:fld id="{6B80381D-4AB5-B040-9FC9-32E7C7690B63}" type="datetime1">
+              <a:rPr lang="en-US" smtClean="0"/>
+              <a:t>11/1/15</a:t>
             </a:fld>
             <a:endParaRPr lang="en-US"/>
           </a:p>
@@ -1520,7 +1603,7 @@
           <a:p>
             <a:r>
               <a:rPr lang="en-US" smtClean="0"/>
-              <a:t>© EV3Lessons.com, 2015, (Last edit: 2/26/15)</a:t>
+              <a:t>© EV3Lessons.com, 2015, (Last edit: 11/01/15)</a:t>
             </a:r>
             <a:endParaRPr lang="en-US"/>
           </a:p>
@@ -1674,9 +1757,9 @@
           <a:bodyPr/>
           <a:lstStyle/>
           <a:p>
-            <a:fld id="{1022EB12-689B-4FEB-88B6-4643836D4D2F}" type="datetime1">
-              <a:rPr lang="en-US" smtClean="0"/>
-              <a:t>2/28/2015</a:t>
+            <a:fld id="{053BFB22-43C5-AD42-A158-9D81081DC704}" type="datetime1">
+              <a:rPr lang="en-US" smtClean="0"/>
+              <a:t>11/1/15</a:t>
             </a:fld>
             <a:endParaRPr lang="en-US"/>
           </a:p>
@@ -1699,7 +1782,7 @@
           <a:p>
             <a:r>
               <a:rPr lang="en-US" smtClean="0"/>
-              <a:t>© EV3Lessons.com, 2015, (Last edit: 2/26/15)</a:t>
+              <a:t>© EV3Lessons.com, 2015, (Last edit: 11/01/15)</a:t>
             </a:r>
             <a:endParaRPr lang="en-US"/>
           </a:p>
@@ -1939,9 +2022,9 @@
           <a:bodyPr/>
           <a:lstStyle/>
           <a:p>
-            <a:fld id="{BE0891F5-5077-4EE3-A8A1-63E4004FF903}" type="datetime1">
-              <a:rPr lang="en-US" smtClean="0"/>
-              <a:t>2/28/2015</a:t>
+            <a:fld id="{F9531A7B-F17E-BA48-BEE3-218A313D12A3}" type="datetime1">
+              <a:rPr lang="en-US" smtClean="0"/>
+              <a:t>11/1/15</a:t>
             </a:fld>
             <a:endParaRPr lang="en-US"/>
           </a:p>
@@ -1987,7 +2070,7 @@
           <a:p>
             <a:r>
               <a:rPr lang="en-US" smtClean="0"/>
-              <a:t>© EV3Lessons.com, 2015, (Last edit: 2/26/15)</a:t>
+              <a:t>© EV3Lessons.com, 2015, (Last edit: 11/01/15)</a:t>
             </a:r>
             <a:endParaRPr lang="en-US"/>
           </a:p>
@@ -2238,9 +2321,9 @@
           <a:bodyPr/>
           <a:lstStyle/>
           <a:p>
-            <a:fld id="{2AC1AF06-981D-4728-913D-13A597146948}" type="datetime1">
-              <a:rPr lang="en-US" smtClean="0"/>
-              <a:t>2/28/2015</a:t>
+            <a:fld id="{0DFEF492-EB6F-3045-8E2E-23E02EA38137}" type="datetime1">
+              <a:rPr lang="en-US" smtClean="0"/>
+              <a:t>11/1/15</a:t>
             </a:fld>
             <a:endParaRPr lang="en-US"/>
           </a:p>
@@ -2263,7 +2346,7 @@
           <a:p>
             <a:r>
               <a:rPr lang="en-US" smtClean="0"/>
-              <a:t>© EV3Lessons.com, 2015, (Last edit: 2/26/15)</a:t>
+              <a:t>© EV3Lessons.com, 2015, (Last edit: 11/01/15)</a:t>
             </a:r>
             <a:endParaRPr lang="en-US"/>
           </a:p>
@@ -2688,9 +2771,9 @@
           <a:bodyPr/>
           <a:lstStyle/>
           <a:p>
-            <a:fld id="{8AA4FD58-8F7E-40DC-B013-43EC8861B127}" type="datetime1">
-              <a:rPr lang="en-US" smtClean="0"/>
-              <a:t>2/28/2015</a:t>
+            <a:fld id="{E77766D9-8471-4547-AEDA-E4B9150624F4}" type="datetime1">
+              <a:rPr lang="en-US" smtClean="0"/>
+              <a:t>11/1/15</a:t>
             </a:fld>
             <a:endParaRPr lang="en-US"/>
           </a:p>
@@ -2713,7 +2796,7 @@
           <a:p>
             <a:r>
               <a:rPr lang="en-US" smtClean="0"/>
-              <a:t>© EV3Lessons.com, 2015, (Last edit: 2/26/15)</a:t>
+              <a:t>© EV3Lessons.com, 2015, (Last edit: 11/01/15)</a:t>
             </a:r>
             <a:endParaRPr lang="en-US"/>
           </a:p>
@@ -2805,9 +2888,9 @@
           <a:bodyPr/>
           <a:lstStyle/>
           <a:p>
-            <a:fld id="{2083442F-774E-447D-ACDB-682104012A7F}" type="datetime1">
-              <a:rPr lang="en-US" smtClean="0"/>
-              <a:t>2/28/2015</a:t>
+            <a:fld id="{4846874A-CD45-764C-816E-3E208066D60E}" type="datetime1">
+              <a:rPr lang="en-US" smtClean="0"/>
+              <a:t>11/1/15</a:t>
             </a:fld>
             <a:endParaRPr lang="en-US"/>
           </a:p>
@@ -2830,7 +2913,7 @@
           <a:p>
             <a:r>
               <a:rPr lang="en-US" smtClean="0"/>
-              <a:t>© EV3Lessons.com, 2015, (Last edit: 2/26/15)</a:t>
+              <a:t>© EV3Lessons.com, 2015, (Last edit: 11/01/15)</a:t>
             </a:r>
             <a:endParaRPr lang="en-US"/>
           </a:p>
@@ -2899,9 +2982,9 @@
           <a:bodyPr/>
           <a:lstStyle/>
           <a:p>
-            <a:fld id="{5809C5C0-F335-44B4-B962-A13900E5B6F5}" type="datetime1">
-              <a:rPr lang="en-US" smtClean="0"/>
-              <a:t>2/28/2015</a:t>
+            <a:fld id="{217EC058-3B08-FF41-ADD9-86F61707E923}" type="datetime1">
+              <a:rPr lang="en-US" smtClean="0"/>
+              <a:t>11/1/15</a:t>
             </a:fld>
             <a:endParaRPr lang="en-US"/>
           </a:p>
@@ -2924,7 +3007,7 @@
           <a:p>
             <a:r>
               <a:rPr lang="en-US" smtClean="0"/>
-              <a:t>© EV3Lessons.com, 2015, (Last edit: 2/26/15)</a:t>
+              <a:t>© EV3Lessons.com, 2015, (Last edit: 11/01/15)</a:t>
             </a:r>
             <a:endParaRPr lang="en-US"/>
           </a:p>
@@ -3145,9 +3228,9 @@
           <a:bodyPr/>
           <a:lstStyle/>
           <a:p>
-            <a:fld id="{69F957CB-9920-4382-A664-6246417E8504}" type="datetime1">
-              <a:rPr lang="en-US" smtClean="0"/>
-              <a:t>2/28/2015</a:t>
+            <a:fld id="{A812FCC7-9986-E94C-97A2-D55428F204C8}" type="datetime1">
+              <a:rPr lang="en-US" smtClean="0"/>
+              <a:t>11/1/15</a:t>
             </a:fld>
             <a:endParaRPr lang="en-US"/>
           </a:p>
@@ -3170,7 +3253,7 @@
           <a:p>
             <a:r>
               <a:rPr lang="en-US" smtClean="0"/>
-              <a:t>© EV3Lessons.com, 2015, (Last edit: 2/26/15)</a:t>
+              <a:t>© EV3Lessons.com, 2015, (Last edit: 11/01/15)</a:t>
             </a:r>
             <a:endParaRPr lang="en-US"/>
           </a:p>
@@ -3443,9 +3526,9 @@
           <a:bodyPr/>
           <a:lstStyle/>
           <a:p>
-            <a:fld id="{4237644F-E428-4042-A149-8B12818FE8BB}" type="datetime1">
-              <a:rPr lang="en-US" smtClean="0"/>
-              <a:t>2/28/2015</a:t>
+            <a:fld id="{BDD86D50-32F9-734C-ADCD-FD64F05E2AA1}" type="datetime1">
+              <a:rPr lang="en-US" smtClean="0"/>
+              <a:t>11/1/15</a:t>
             </a:fld>
             <a:endParaRPr lang="en-US"/>
           </a:p>
@@ -3468,7 +3551,7 @@
           <a:p>
             <a:r>
               <a:rPr lang="en-US" smtClean="0"/>
-              <a:t>© EV3Lessons.com, 2015, (Last edit: 2/26/15)</a:t>
+              <a:t>© EV3Lessons.com, 2015, (Last edit: 11/01/15)</a:t>
             </a:r>
             <a:endParaRPr lang="en-US"/>
           </a:p>
@@ -3741,9 +3824,9 @@
             </a:lvl1pPr>
           </a:lstStyle>
           <a:p>
-            <a:fld id="{5D172011-4CD2-4141-A550-6EC2A6B0A363}" type="datetime1">
-              <a:rPr lang="en-US" smtClean="0"/>
-              <a:t>2/28/2015</a:t>
+            <a:fld id="{BBB9EF71-9ACD-524A-B753-2850C8B44F29}" type="datetime1">
+              <a:rPr lang="en-US" smtClean="0"/>
+              <a:t>11/1/15</a:t>
             </a:fld>
             <a:endParaRPr lang="en-US"/>
           </a:p>
@@ -3782,7 +3865,7 @@
           <a:p>
             <a:r>
               <a:rPr lang="en-US" smtClean="0"/>
-              <a:t>© EV3Lessons.com, 2015, (Last edit: 2/26/15)</a:t>
+              <a:t>© EV3Lessons.com, 2015, (Last edit: 11/01/15)</a:t>
             </a:r>
             <a:endParaRPr lang="en-US"/>
           </a:p>
@@ -4429,7 +4512,7 @@
           <a:noFill/>
           <a:extLst>
             <a:ext uri="{909E8E84-426E-40dd-AFC4-6F175D3DCCD1}">
-              <a14:hiddenFill xmlns:a14="http://schemas.microsoft.com/office/drawing/2010/main" xmlns="">
+              <a14:hiddenFill xmlns="" xmlns:a14="http://schemas.microsoft.com/office/drawing/2010/main">
                 <a:solidFill>
                   <a:srgbClr val="FFFFFF"/>
                 </a:solidFill>
@@ -4492,152 +4575,6 @@
           <a:p>
             <a:r>
               <a:rPr lang="en-US" dirty="0" smtClean="0"/>
-              <a:t>Challenge 1 Solution</a:t>
-            </a:r>
-            <a:endParaRPr lang="en-US" dirty="0"/>
-          </a:p>
-        </p:txBody>
-      </p:sp>
-      <p:sp>
-        <p:nvSpPr>
-          <p:cNvPr id="3" name="Content Placeholder 2"/>
-          <p:cNvSpPr>
-            <a:spLocks noGrp="1"/>
-          </p:cNvSpPr>
-          <p:nvPr>
-            <p:ph idx="1"/>
-          </p:nvPr>
-        </p:nvSpPr>
-        <p:spPr/>
-        <p:txBody>
-          <a:bodyPr/>
-          <a:lstStyle/>
-          <a:p>
-            <a:r>
-              <a:rPr lang="en-US" dirty="0" smtClean="0"/>
-              <a:t>Add screenshot</a:t>
-            </a:r>
-            <a:endParaRPr lang="en-US" dirty="0"/>
-          </a:p>
-        </p:txBody>
-      </p:sp>
-      <p:sp>
-        <p:nvSpPr>
-          <p:cNvPr id="4" name="Slide Number Placeholder 3"/>
-          <p:cNvSpPr>
-            <a:spLocks noGrp="1"/>
-          </p:cNvSpPr>
-          <p:nvPr>
-            <p:ph type="sldNum" sz="quarter" idx="12"/>
-          </p:nvPr>
-        </p:nvSpPr>
-        <p:spPr/>
-        <p:txBody>
-          <a:bodyPr/>
-          <a:lstStyle/>
-          <a:p>
-            <a:fld id="{4DBC7FC8-25FB-FC45-8177-2B991DA6778C}" type="slidenum">
-              <a:rPr lang="en-US" smtClean="0"/>
-              <a:t>10</a:t>
-            </a:fld>
-            <a:endParaRPr lang="en-US"/>
-          </a:p>
-        </p:txBody>
-      </p:sp>
-      <p:sp>
-        <p:nvSpPr>
-          <p:cNvPr id="6" name="Footer Placeholder 5"/>
-          <p:cNvSpPr>
-            <a:spLocks noGrp="1"/>
-          </p:cNvSpPr>
-          <p:nvPr>
-            <p:ph type="ftr" sz="quarter" idx="11"/>
-          </p:nvPr>
-        </p:nvSpPr>
-        <p:spPr/>
-        <p:txBody>
-          <a:bodyPr/>
-          <a:lstStyle/>
-          <a:p>
-            <a:r>
-              <a:rPr lang="en-US" smtClean="0"/>
-              <a:t>© EV3Lessons.com, 2015, (Last edit: 2/26/15)</a:t>
-            </a:r>
-            <a:endParaRPr lang="en-US"/>
-          </a:p>
-        </p:txBody>
-      </p:sp>
-      <p:pic>
-        <p:nvPicPr>
-          <p:cNvPr id="7" name="Picture 6"/>
-          <p:cNvPicPr>
-            <a:picLocks noChangeAspect="1"/>
-          </p:cNvPicPr>
-          <p:nvPr/>
-        </p:nvPicPr>
-        <p:blipFill>
-          <a:blip r:embed="rId2"/>
-          <a:stretch>
-            <a:fillRect/>
-          </a:stretch>
-        </p:blipFill>
-        <p:spPr>
-          <a:xfrm>
-            <a:off x="333088" y="1121023"/>
-            <a:ext cx="7620946" cy="4828085"/>
-          </a:xfrm>
-          <a:prstGeom prst="rect">
-            <a:avLst/>
-          </a:prstGeom>
-        </p:spPr>
-      </p:pic>
-    </p:spTree>
-    <p:extLst>
-      <p:ext uri="{BB962C8B-B14F-4D97-AF65-F5344CB8AC3E}">
-        <p14:creationId xmlns:p14="http://schemas.microsoft.com/office/powerpoint/2010/main" val="774892794"/>
-      </p:ext>
-    </p:extLst>
-  </p:cSld>
-  <p:clrMapOvr>
-    <a:masterClrMapping/>
-  </p:clrMapOvr>
-</p:sld>
-</file>
-
-<file path=ppt/slides/slide11.xml><?xml version="1.0" encoding="utf-8"?>
-<p:sld xmlns:a="http://schemas.openxmlformats.org/drawingml/2006/main" xmlns:r="http://schemas.openxmlformats.org/officeDocument/2006/relationships" xmlns:p="http://schemas.openxmlformats.org/presentationml/2006/main">
-  <p:cSld>
-    <p:spTree>
-      <p:nvGrpSpPr>
-        <p:cNvPr id="1" name=""/>
-        <p:cNvGrpSpPr/>
-        <p:nvPr/>
-      </p:nvGrpSpPr>
-      <p:grpSpPr>
-        <a:xfrm>
-          <a:off x="0" y="0"/>
-          <a:ext cx="0" cy="0"/>
-          <a:chOff x="0" y="0"/>
-          <a:chExt cx="0" cy="0"/>
-        </a:xfrm>
-      </p:grpSpPr>
-      <p:sp>
-        <p:nvSpPr>
-          <p:cNvPr id="2" name="Title 1"/>
-          <p:cNvSpPr>
-            <a:spLocks noGrp="1"/>
-          </p:cNvSpPr>
-          <p:nvPr>
-            <p:ph type="title"/>
-          </p:nvPr>
-        </p:nvSpPr>
-        <p:spPr/>
-        <p:txBody>
-          <a:bodyPr/>
-          <a:lstStyle/>
-          <a:p>
-            <a:r>
-              <a:rPr lang="en-US" dirty="0" smtClean="0"/>
               <a:t>CHALLENGE 2</a:t>
             </a:r>
             <a:endParaRPr lang="en-US" dirty="0"/>
@@ -4682,7 +4619,7 @@
           <p:nvPr/>
         </p:nvPicPr>
         <p:blipFill>
-          <a:blip r:embed="rId2"/>
+          <a:blip r:embed="rId3"/>
           <a:stretch>
             <a:fillRect/>
           </a:stretch>
@@ -4706,7 +4643,7 @@
           <p:nvPr/>
         </p:nvPicPr>
         <p:blipFill>
-          <a:blip r:embed="rId3">
+          <a:blip r:embed="rId4">
             <a:extLst>
               <a:ext uri="{28A0092B-C50C-407E-A947-70E740481C1C}">
                 <a14:useLocalDpi xmlns:a14="http://schemas.microsoft.com/office/drawing/2010/main" val="0"/>
@@ -4736,7 +4673,7 @@
           <p:nvPr/>
         </p:nvPicPr>
         <p:blipFill>
-          <a:blip r:embed="rId4">
+          <a:blip r:embed="rId5">
             <a:extLst>
               <a:ext uri="{28A0092B-C50C-407E-A947-70E740481C1C}">
                 <a14:useLocalDpi xmlns:a14="http://schemas.microsoft.com/office/drawing/2010/main" val="0"/>
@@ -4901,7 +4838,7 @@
           <a:p>
             <a:fld id="{4DBC7FC8-25FB-FC45-8177-2B991DA6778C}" type="slidenum">
               <a:rPr lang="en-US" smtClean="0"/>
-              <a:t>11</a:t>
+              <a:t>10</a:t>
             </a:fld>
             <a:endParaRPr lang="en-US"/>
           </a:p>
@@ -4924,7 +4861,7 @@
           <a:p>
             <a:r>
               <a:rPr lang="en-US" smtClean="0"/>
-              <a:t>© EV3Lessons.com, 2015, (Last edit: 2/26/15)</a:t>
+              <a:t>© EV3Lessons.com, 2015, (Last edit: 11/01/15)</a:t>
             </a:r>
             <a:endParaRPr lang="en-US"/>
           </a:p>
@@ -5367,7 +5304,7 @@
 </p:sld>
 </file>
 
-<file path=ppt/slides/slide12.xml><?xml version="1.0" encoding="utf-8"?>
+<file path=ppt/slides/slide11.xml><?xml version="1.0" encoding="utf-8"?>
 <p:sld xmlns:a="http://schemas.openxmlformats.org/drawingml/2006/main" xmlns:r="http://schemas.openxmlformats.org/officeDocument/2006/relationships" xmlns:p="http://schemas.openxmlformats.org/presentationml/2006/main">
   <p:cSld>
     <p:spTree>
@@ -5409,12 +5346,12 @@
       </p:sp>
       <p:sp>
         <p:nvSpPr>
-          <p:cNvPr id="3" name="Content Placeholder 2"/>
-          <p:cNvSpPr>
-            <a:spLocks noGrp="1"/>
-          </p:cNvSpPr>
-          <p:nvPr>
-            <p:ph idx="1"/>
+          <p:cNvPr id="4" name="Slide Number Placeholder 3"/>
+          <p:cNvSpPr>
+            <a:spLocks noGrp="1"/>
+          </p:cNvSpPr>
+          <p:nvPr>
+            <p:ph type="sldNum" sz="quarter" idx="12"/>
           </p:nvPr>
         </p:nvSpPr>
         <p:spPr/>
@@ -5422,32 +5359,9 @@
           <a:bodyPr/>
           <a:lstStyle/>
           <a:p>
-            <a:r>
-              <a:rPr lang="en-US" dirty="0" smtClean="0"/>
-              <a:t>Add Screenshot</a:t>
-            </a:r>
-            <a:endParaRPr lang="en-US" dirty="0"/>
-          </a:p>
-        </p:txBody>
-      </p:sp>
-      <p:sp>
-        <p:nvSpPr>
-          <p:cNvPr id="4" name="Slide Number Placeholder 3"/>
-          <p:cNvSpPr>
-            <a:spLocks noGrp="1"/>
-          </p:cNvSpPr>
-          <p:nvPr>
-            <p:ph type="sldNum" sz="quarter" idx="12"/>
-          </p:nvPr>
-        </p:nvSpPr>
-        <p:spPr/>
-        <p:txBody>
-          <a:bodyPr/>
-          <a:lstStyle/>
-          <a:p>
             <a:fld id="{4DBC7FC8-25FB-FC45-8177-2B991DA6778C}" type="slidenum">
               <a:rPr lang="en-US" smtClean="0"/>
-              <a:t>12</a:t>
+              <a:t>11</a:t>
             </a:fld>
             <a:endParaRPr lang="en-US"/>
           </a:p>
@@ -5470,7 +5384,7 @@
           <a:p>
             <a:r>
               <a:rPr lang="en-US" smtClean="0"/>
-              <a:t>© EV3Lessons.com, 2015, (Last edit: 2/26/15)</a:t>
+              <a:t>© EV3Lessons.com, 2015, (Last edit: 11/01/15)</a:t>
             </a:r>
             <a:endParaRPr lang="en-US"/>
           </a:p>
@@ -5478,22 +5392,28 @@
       </p:sp>
       <p:pic>
         <p:nvPicPr>
-          <p:cNvPr id="7" name="Picture 6"/>
+          <p:cNvPr id="17" name="Picture 16"/>
           <p:cNvPicPr>
             <a:picLocks noChangeAspect="1"/>
           </p:cNvPicPr>
           <p:nvPr/>
         </p:nvPicPr>
         <p:blipFill>
-          <a:blip r:embed="rId2"/>
+          <a:blip r:embed="rId2">
+            <a:extLst>
+              <a:ext uri="{28A0092B-C50C-407E-A947-70E740481C1C}">
+                <a14:useLocalDpi xmlns:a14="http://schemas.microsoft.com/office/drawing/2010/main" val="0"/>
+              </a:ext>
+            </a:extLst>
+          </a:blip>
           <a:stretch>
             <a:fillRect/>
           </a:stretch>
         </p:blipFill>
         <p:spPr>
           <a:xfrm>
-            <a:off x="264118" y="1074373"/>
-            <a:ext cx="7341219" cy="4885751"/>
+            <a:off x="322728" y="1524318"/>
+            <a:ext cx="8415235" cy="3445164"/>
           </a:xfrm>
           <a:prstGeom prst="rect">
             <a:avLst/>
@@ -5520,7 +5440,7 @@
 </p:sld>
 </file>
 
-<file path=ppt/slides/slide13.xml><?xml version="1.0" encoding="utf-8"?>
+<file path=ppt/slides/slide12.xml><?xml version="1.0" encoding="utf-8"?>
 <p:sld xmlns:a="http://schemas.openxmlformats.org/drawingml/2006/main" xmlns:r="http://schemas.openxmlformats.org/officeDocument/2006/relationships" xmlns:p="http://schemas.openxmlformats.org/presentationml/2006/main">
   <p:cSld>
     <p:spTree>
@@ -5744,7 +5664,7 @@
           <a:p>
             <a:r>
               <a:rPr lang="en-US" smtClean="0"/>
-              <a:t>© EV3Lessons.com, 2015, (Last edit: 2/26/15)</a:t>
+              <a:t>© EV3Lessons.com, 2015, (Last edit: 11/01/15)</a:t>
             </a:r>
             <a:endParaRPr lang="en-US"/>
           </a:p>
@@ -5767,7 +5687,7 @@
           <a:p>
             <a:fld id="{4DBC7FC8-25FB-FC45-8177-2B991DA6778C}" type="slidenum">
               <a:rPr lang="en-US" smtClean="0"/>
-              <a:t>13</a:t>
+              <a:t>12</a:t>
             </a:fld>
             <a:endParaRPr lang="en-US"/>
           </a:p>
@@ -6012,7 +5932,7 @@
 </p:sld>
 </file>
 
-<file path=ppt/slides/slide14.xml><?xml version="1.0" encoding="utf-8"?>
+<file path=ppt/slides/slide13.xml><?xml version="1.0" encoding="utf-8"?>
 <p:sld xmlns:a="http://schemas.openxmlformats.org/drawingml/2006/main" xmlns:r="http://schemas.openxmlformats.org/officeDocument/2006/relationships" xmlns:p="http://schemas.openxmlformats.org/presentationml/2006/main">
   <p:cSld>
     <p:spTree>
@@ -6149,7 +6069,7 @@
           <a:effectLst/>
           <a:extLst>
             <a:ext uri="{91240B29-F687-4f45-9708-019B960494DF}">
-              <a14:hiddenLine xmlns:a14="http://schemas.microsoft.com/office/drawing/2010/main" xmlns="" w="9525">
+              <a14:hiddenLine xmlns="" xmlns:a14="http://schemas.microsoft.com/office/drawing/2010/main" w="9525">
                 <a:solidFill>
                   <a:schemeClr val="tx1"/>
                 </a:solidFill>
@@ -6159,7 +6079,7 @@
               </a14:hiddenLine>
             </a:ext>
             <a:ext uri="{AF507438-7753-43e0-B8FC-AC1667EBCBE1}">
-              <a14:hiddenEffects xmlns:a14="http://schemas.microsoft.com/office/drawing/2010/main" xmlns="">
+              <a14:hiddenEffects xmlns="" xmlns:a14="http://schemas.microsoft.com/office/drawing/2010/main">
                 <a:effectLst>
                   <a:outerShdw dist="35921" dir="2700000" algn="ctr" rotWithShape="0">
                     <a:schemeClr val="bg2"/>
@@ -6512,7 +6432,7 @@
           <a:noFill/>
           <a:extLst>
             <a:ext uri="{909E8E84-426E-40dd-AFC4-6F175D3DCCD1}">
-              <a14:hiddenFill xmlns:a14="http://schemas.microsoft.com/office/drawing/2010/main" xmlns="">
+              <a14:hiddenFill xmlns="" xmlns:a14="http://schemas.microsoft.com/office/drawing/2010/main">
                 <a:solidFill>
                   <a:srgbClr val="FFFFFF"/>
                 </a:solidFill>
@@ -6538,7 +6458,7 @@
           <a:p>
             <a:fld id="{4DBC7FC8-25FB-FC45-8177-2B991DA6778C}" type="slidenum">
               <a:rPr lang="en-US" smtClean="0"/>
-              <a:t>14</a:t>
+              <a:t>13</a:t>
             </a:fld>
             <a:endParaRPr lang="en-US"/>
           </a:p>
@@ -6561,7 +6481,7 @@
           <a:p>
             <a:r>
               <a:rPr lang="en-US" smtClean="0"/>
-              <a:t>© EV3Lessons.com, 2015, (Last edit: 2/26/15)</a:t>
+              <a:t>© EV3Lessons.com, 2015, (Last edit: 11/01/15)</a:t>
             </a:r>
             <a:endParaRPr lang="en-US"/>
           </a:p>
@@ -6708,7 +6628,7 @@
           <a:p>
             <a:r>
               <a:rPr lang="en-US" smtClean="0"/>
-              <a:t>© EV3Lessons.com, 2015, (Last edit: 2/26/2015)</a:t>
+              <a:t>© EV3Lessons.com, 2015, (Last edit: 11/01/15)</a:t>
             </a:r>
             <a:endParaRPr lang="en-US"/>
           </a:p>
@@ -6832,44 +6752,28 @@
           <a:p>
             <a:pPr marL="800100" lvl="1" indent="-342900"/>
             <a:r>
-              <a:rPr lang="en-US" dirty="0" smtClean="0">
-                <a:solidFill>
-                  <a:srgbClr val="00B050"/>
-                </a:solidFill>
-              </a:rPr>
+              <a:rPr lang="en-US" dirty="0" smtClean="0"/>
               <a:t>Color – measures color and darkness</a:t>
             </a:r>
           </a:p>
           <a:p>
             <a:pPr marL="800100" lvl="1" indent="-342900"/>
             <a:r>
-              <a:rPr lang="en-US" dirty="0" smtClean="0">
-                <a:solidFill>
-                  <a:srgbClr val="00B050"/>
-                </a:solidFill>
-              </a:rPr>
+              <a:rPr lang="en-US" dirty="0" smtClean="0"/>
               <a:t>Gyro – measures rotation of robot </a:t>
             </a:r>
           </a:p>
           <a:p>
             <a:pPr marL="800100" lvl="1" indent="-342900"/>
             <a:r>
-              <a:rPr lang="en-US" dirty="0" smtClean="0">
-                <a:solidFill>
-                  <a:srgbClr val="00B050"/>
-                </a:solidFill>
-              </a:rPr>
+              <a:rPr lang="en-US" dirty="0" smtClean="0"/>
               <a:t>Ultrasonic – measures distance to nearby surfaces</a:t>
             </a:r>
           </a:p>
           <a:p>
             <a:pPr marL="800100" lvl="1" indent="-342900"/>
             <a:r>
-              <a:rPr lang="en-US" dirty="0" smtClean="0">
-                <a:solidFill>
-                  <a:srgbClr val="00B050"/>
-                </a:solidFill>
-              </a:rPr>
+              <a:rPr lang="en-US" dirty="0" smtClean="0"/>
               <a:t>Touch – measures contact with surface</a:t>
             </a:r>
           </a:p>
@@ -6942,7 +6846,7 @@
           <a:noFill/>
           <a:extLst>
             <a:ext uri="{909E8E84-426E-40dd-AFC4-6F175D3DCCD1}">
-              <a14:hiddenFill xmlns:a14="http://schemas.microsoft.com/office/drawing/2010/main" xmlns="">
+              <a14:hiddenFill xmlns="" xmlns:a14="http://schemas.microsoft.com/office/drawing/2010/main">
                 <a:solidFill>
                   <a:srgbClr val="FFFFFF"/>
                 </a:solidFill>
@@ -7014,44 +6918,9 @@
           <a:p>
             <a:r>
               <a:rPr lang="en-US" smtClean="0"/>
-              <a:t>© EV3Lessons.com, 2015, (Last edit: 2/26/15)</a:t>
+              <a:t>© EV3Lessons.com, 2015, (Last edit: 11/01/15)</a:t>
             </a:r>
             <a:endParaRPr lang="en-US"/>
-          </a:p>
-        </p:txBody>
-      </p:sp>
-      <p:sp>
-        <p:nvSpPr>
-          <p:cNvPr id="7" name="TextBox 6"/>
-          <p:cNvSpPr txBox="1"/>
-          <p:nvPr/>
-        </p:nvSpPr>
-        <p:spPr>
-          <a:xfrm>
-            <a:off x="6616095" y="1630255"/>
-            <a:ext cx="2046283" cy="923330"/>
-          </a:xfrm>
-          <a:prstGeom prst="rect">
-            <a:avLst/>
-          </a:prstGeom>
-          <a:noFill/>
-          <a:ln>
-            <a:solidFill>
-              <a:schemeClr val="tx1"/>
-            </a:solidFill>
-          </a:ln>
-        </p:spPr>
-        <p:txBody>
-          <a:bodyPr wrap="square" rtlCol="0">
-            <a:spAutoFit/>
-          </a:bodyPr>
-          <a:lstStyle/>
-          <a:p>
-            <a:r>
-              <a:rPr lang="en-US" i="1" dirty="0" smtClean="0"/>
-              <a:t>Our lessons will cover the 4 sensors in green.</a:t>
-            </a:r>
-            <a:endParaRPr lang="en-US" i="1" dirty="0"/>
           </a:p>
         </p:txBody>
       </p:sp>
@@ -7262,7 +7131,7 @@
           <a:p>
             <a:r>
               <a:rPr lang="en-US" smtClean="0"/>
-              <a:t>© EV3Lessons.com, 2015, (Last edit: 2/26/15)</a:t>
+              <a:t>© EV3Lessons.com, 2015, (Last edit: 11/01/15)</a:t>
             </a:r>
             <a:endParaRPr lang="en-US"/>
           </a:p>
@@ -8243,7 +8112,7 @@
           <a:p>
             <a:r>
               <a:rPr lang="en-US" smtClean="0"/>
-              <a:t>© EV3Lessons.com, 2015, (Last edit: 2/26/15)</a:t>
+              <a:t>© EV3Lessons.com, 2015, (Last edit: 11/01/15)</a:t>
             </a:r>
             <a:endParaRPr lang="en-US"/>
           </a:p>
@@ -8780,7 +8649,7 @@
           <a:p>
             <a:r>
               <a:rPr lang="en-US" smtClean="0"/>
-              <a:t>© EV3Lessons.com, 2015, (Last edit: 2/26/15)</a:t>
+              <a:t>© EV3Lessons.com, 2015, (Last edit: 11/01/15)</a:t>
             </a:r>
             <a:endParaRPr lang="en-US"/>
           </a:p>
@@ -8955,9 +8824,362 @@
           <a:chExt cx="0" cy="0"/>
         </a:xfrm>
       </p:grpSpPr>
+      <p:sp>
+        <p:nvSpPr>
+          <p:cNvPr id="2" name="Title 1"/>
+          <p:cNvSpPr>
+            <a:spLocks noGrp="1"/>
+          </p:cNvSpPr>
+          <p:nvPr>
+            <p:ph type="title"/>
+          </p:nvPr>
+        </p:nvSpPr>
+        <p:spPr/>
+        <p:txBody>
+          <a:bodyPr/>
+          <a:lstStyle/>
+          <a:p>
+            <a:r>
+              <a:rPr lang="en-US" dirty="0" smtClean="0"/>
+              <a:t>Move on and OFF</a:t>
+            </a:r>
+            <a:endParaRPr lang="en-US" dirty="0"/>
+          </a:p>
+        </p:txBody>
+      </p:sp>
+      <p:sp>
+        <p:nvSpPr>
+          <p:cNvPr id="4" name="Footer Placeholder 3"/>
+          <p:cNvSpPr>
+            <a:spLocks noGrp="1"/>
+          </p:cNvSpPr>
+          <p:nvPr>
+            <p:ph type="ftr" sz="quarter" idx="11"/>
+          </p:nvPr>
+        </p:nvSpPr>
+        <p:spPr/>
+        <p:txBody>
+          <a:bodyPr/>
+          <a:lstStyle/>
+          <a:p>
+            <a:r>
+              <a:rPr lang="en-US" smtClean="0"/>
+              <a:t>© EV3Lessons.com, 2015, (Last edit: 11/01/15)</a:t>
+            </a:r>
+            <a:endParaRPr lang="en-US"/>
+          </a:p>
+        </p:txBody>
+      </p:sp>
+      <p:sp>
+        <p:nvSpPr>
+          <p:cNvPr id="5" name="Slide Number Placeholder 4"/>
+          <p:cNvSpPr>
+            <a:spLocks noGrp="1"/>
+          </p:cNvSpPr>
+          <p:nvPr>
+            <p:ph type="sldNum" sz="quarter" idx="12"/>
+          </p:nvPr>
+        </p:nvSpPr>
+        <p:spPr/>
+        <p:txBody>
+          <a:bodyPr/>
+          <a:lstStyle/>
+          <a:p>
+            <a:fld id="{4DBC7FC8-25FB-FC45-8177-2B991DA6778C}" type="slidenum">
+              <a:rPr lang="en-US" smtClean="0"/>
+              <a:t>7</a:t>
+            </a:fld>
+            <a:endParaRPr lang="en-US"/>
+          </a:p>
+        </p:txBody>
+      </p:sp>
+      <p:sp>
+        <p:nvSpPr>
+          <p:cNvPr id="6" name="TextBox 5"/>
+          <p:cNvSpPr txBox="1"/>
+          <p:nvPr/>
+        </p:nvSpPr>
+        <p:spPr>
+          <a:xfrm>
+            <a:off x="5175701" y="3830831"/>
+            <a:ext cx="3128895" cy="923330"/>
+          </a:xfrm>
+          <a:prstGeom prst="rect">
+            <a:avLst/>
+          </a:prstGeom>
+          <a:solidFill>
+            <a:srgbClr val="FFFF00"/>
+          </a:solidFill>
+        </p:spPr>
+        <p:txBody>
+          <a:bodyPr wrap="square" rtlCol="0">
+            <a:spAutoFit/>
+          </a:bodyPr>
+          <a:lstStyle/>
+          <a:p>
+            <a:r>
+              <a:rPr lang="en-US" dirty="0" smtClean="0">
+                <a:solidFill>
+                  <a:srgbClr val="FF0000"/>
+                </a:solidFill>
+              </a:rPr>
+              <a:t>Rookie Tip: </a:t>
+            </a:r>
+            <a:r>
+              <a:rPr lang="en-US" dirty="0" smtClean="0"/>
+              <a:t>Motor On needs to be followed by another block (e.g. Wait Block)</a:t>
+            </a:r>
+            <a:endParaRPr lang="en-US" dirty="0"/>
+          </a:p>
+        </p:txBody>
+      </p:sp>
+      <p:sp>
+        <p:nvSpPr>
+          <p:cNvPr id="7" name="Content Placeholder 2"/>
+          <p:cNvSpPr txBox="1">
+            <a:spLocks/>
+          </p:cNvSpPr>
+          <p:nvPr/>
+        </p:nvSpPr>
+        <p:spPr>
+          <a:xfrm>
+            <a:off x="457200" y="1301374"/>
+            <a:ext cx="5683541" cy="4855586"/>
+          </a:xfrm>
+          <a:prstGeom prst="rect">
+            <a:avLst/>
+          </a:prstGeom>
+        </p:spPr>
+        <p:txBody>
+          <a:bodyPr vert="horz" lIns="91440" tIns="45720" rIns="91440" bIns="45720" rtlCol="0">
+            <a:normAutofit/>
+          </a:bodyPr>
+          <a:lstStyle>
+            <a:lvl1pPr marL="0" indent="0" algn="l" defTabSz="914400" rtl="0" eaLnBrk="1" latinLnBrk="0" hangingPunct="1">
+              <a:spcBef>
+                <a:spcPct val="20000"/>
+              </a:spcBef>
+              <a:spcAft>
+                <a:spcPts val="600"/>
+              </a:spcAft>
+              <a:buFont typeface="Arial" pitchFamily="34" charset="0"/>
+              <a:buNone/>
+              <a:defRPr sz="2000" b="1" kern="1200">
+                <a:solidFill>
+                  <a:schemeClr val="tx1"/>
+                </a:solidFill>
+                <a:latin typeface="+mn-lt"/>
+                <a:ea typeface="+mn-ea"/>
+                <a:cs typeface="+mn-cs"/>
+              </a:defRPr>
+            </a:lvl1pPr>
+            <a:lvl2pPr marL="457200" indent="-182880" algn="l" defTabSz="914400" rtl="0" eaLnBrk="1" latinLnBrk="0" hangingPunct="1">
+              <a:spcBef>
+                <a:spcPct val="20000"/>
+              </a:spcBef>
+              <a:buClr>
+                <a:schemeClr val="tx2"/>
+              </a:buClr>
+              <a:buFont typeface="Arial" pitchFamily="34" charset="0"/>
+              <a:buChar char="•"/>
+              <a:defRPr sz="2000" kern="1200">
+                <a:solidFill>
+                  <a:schemeClr val="tx1"/>
+                </a:solidFill>
+                <a:latin typeface="+mn-lt"/>
+                <a:ea typeface="+mn-ea"/>
+                <a:cs typeface="+mn-cs"/>
+              </a:defRPr>
+            </a:lvl2pPr>
+            <a:lvl3pPr marL="1143000" indent="-228600" algn="l" defTabSz="914400" rtl="0" eaLnBrk="1" latinLnBrk="0" hangingPunct="1">
+              <a:spcBef>
+                <a:spcPct val="20000"/>
+              </a:spcBef>
+              <a:buClr>
+                <a:schemeClr val="tx2"/>
+              </a:buClr>
+              <a:buFont typeface="Arial" pitchFamily="34" charset="0"/>
+              <a:buChar char="•"/>
+              <a:defRPr sz="1800" kern="1200">
+                <a:solidFill>
+                  <a:schemeClr val="tx1"/>
+                </a:solidFill>
+                <a:latin typeface="+mn-lt"/>
+                <a:ea typeface="+mn-ea"/>
+                <a:cs typeface="+mn-cs"/>
+              </a:defRPr>
+            </a:lvl3pPr>
+            <a:lvl4pPr marL="1600200" indent="-228600" algn="l" defTabSz="914400" rtl="0" eaLnBrk="1" latinLnBrk="0" hangingPunct="1">
+              <a:spcBef>
+                <a:spcPct val="20000"/>
+              </a:spcBef>
+              <a:buClr>
+                <a:schemeClr val="tx2"/>
+              </a:buClr>
+              <a:buFont typeface="Arial" pitchFamily="34" charset="0"/>
+              <a:buChar char="•"/>
+              <a:defRPr sz="1800" kern="1200">
+                <a:solidFill>
+                  <a:schemeClr val="tx1"/>
+                </a:solidFill>
+                <a:latin typeface="+mn-lt"/>
+                <a:ea typeface="+mn-ea"/>
+                <a:cs typeface="+mn-cs"/>
+              </a:defRPr>
+            </a:lvl4pPr>
+            <a:lvl5pPr marL="2057400" indent="-228600" algn="l" defTabSz="914400" rtl="0" eaLnBrk="1" latinLnBrk="0" hangingPunct="1">
+              <a:spcBef>
+                <a:spcPct val="20000"/>
+              </a:spcBef>
+              <a:buClr>
+                <a:schemeClr val="tx2"/>
+              </a:buClr>
+              <a:buFont typeface="Arial" pitchFamily="34" charset="0"/>
+              <a:buChar char="•"/>
+              <a:defRPr sz="1800" kern="1200" baseline="0">
+                <a:solidFill>
+                  <a:schemeClr val="tx1"/>
+                </a:solidFill>
+                <a:latin typeface="+mn-lt"/>
+                <a:ea typeface="+mn-ea"/>
+                <a:cs typeface="+mn-cs"/>
+              </a:defRPr>
+            </a:lvl5pPr>
+            <a:lvl6pPr marL="2514600" indent="-228600" algn="l" defTabSz="914400" rtl="0" eaLnBrk="1" latinLnBrk="0" hangingPunct="1">
+              <a:spcBef>
+                <a:spcPct val="20000"/>
+              </a:spcBef>
+              <a:buClr>
+                <a:schemeClr val="tx2"/>
+              </a:buClr>
+              <a:buFont typeface="Arial" pitchFamily="34" charset="0"/>
+              <a:buChar char="•"/>
+              <a:defRPr sz="1600" kern="1200">
+                <a:solidFill>
+                  <a:schemeClr val="tx1"/>
+                </a:solidFill>
+                <a:latin typeface="+mn-lt"/>
+                <a:ea typeface="+mn-ea"/>
+                <a:cs typeface="+mn-cs"/>
+              </a:defRPr>
+            </a:lvl6pPr>
+            <a:lvl7pPr marL="2971800" indent="-228600" algn="l" defTabSz="914400" rtl="0" eaLnBrk="1" latinLnBrk="0" hangingPunct="1">
+              <a:spcBef>
+                <a:spcPct val="20000"/>
+              </a:spcBef>
+              <a:buClr>
+                <a:schemeClr val="tx2"/>
+              </a:buClr>
+              <a:buFont typeface="Arial" pitchFamily="34" charset="0"/>
+              <a:buChar char="•"/>
+              <a:defRPr sz="1600" kern="1200">
+                <a:solidFill>
+                  <a:schemeClr val="tx1"/>
+                </a:solidFill>
+                <a:latin typeface="+mn-lt"/>
+                <a:ea typeface="+mn-ea"/>
+                <a:cs typeface="+mn-cs"/>
+              </a:defRPr>
+            </a:lvl7pPr>
+            <a:lvl8pPr marL="3429000" indent="-228600" algn="l" defTabSz="914400" rtl="0" eaLnBrk="1" latinLnBrk="0" hangingPunct="1">
+              <a:spcBef>
+                <a:spcPct val="20000"/>
+              </a:spcBef>
+              <a:buClr>
+                <a:schemeClr val="tx2"/>
+              </a:buClr>
+              <a:buFont typeface="Arial" pitchFamily="34" charset="0"/>
+              <a:buChar char="•"/>
+              <a:defRPr sz="1600" kern="1200">
+                <a:solidFill>
+                  <a:schemeClr val="tx1"/>
+                </a:solidFill>
+                <a:latin typeface="+mn-lt"/>
+                <a:ea typeface="+mn-ea"/>
+                <a:cs typeface="+mn-cs"/>
+              </a:defRPr>
+            </a:lvl8pPr>
+            <a:lvl9pPr marL="3886200" indent="-228600" algn="l" defTabSz="914400" rtl="0" eaLnBrk="1" latinLnBrk="0" hangingPunct="1">
+              <a:spcBef>
+                <a:spcPct val="20000"/>
+              </a:spcBef>
+              <a:buClr>
+                <a:schemeClr val="tx2"/>
+              </a:buClr>
+              <a:buFont typeface="Arial" pitchFamily="34" charset="0"/>
+              <a:buChar char="•"/>
+              <a:defRPr sz="1600" kern="1200">
+                <a:solidFill>
+                  <a:schemeClr val="tx1"/>
+                </a:solidFill>
+                <a:latin typeface="+mn-lt"/>
+                <a:ea typeface="+mn-ea"/>
+                <a:cs typeface="+mn-cs"/>
+              </a:defRPr>
+            </a:lvl9pPr>
+          </a:lstStyle>
+          <a:p>
+            <a:r>
+              <a:rPr lang="en-US" dirty="0" smtClean="0"/>
+              <a:t>What would happen if you placed a Move Steering Block and left the motor “On”?</a:t>
+            </a:r>
+          </a:p>
+          <a:p>
+            <a:r>
+              <a:rPr lang="en-US" dirty="0" smtClean="0"/>
+              <a:t>Would the robot…</a:t>
+            </a:r>
+          </a:p>
+          <a:p>
+            <a:r>
+              <a:rPr lang="en-US" dirty="0" smtClean="0"/>
+              <a:t>	1) Move?</a:t>
+            </a:r>
+          </a:p>
+          <a:p>
+            <a:r>
+              <a:rPr lang="en-US" dirty="0" smtClean="0"/>
+              <a:t>	2) Move for a little while?</a:t>
+            </a:r>
+          </a:p>
+          <a:p>
+            <a:r>
+              <a:rPr lang="en-US" dirty="0" smtClean="0"/>
+              <a:t>	3) Not move at all?</a:t>
+            </a:r>
+          </a:p>
+          <a:p>
+            <a:r>
+              <a:rPr lang="en-US" dirty="0"/>
+              <a:t>	</a:t>
+            </a:r>
+            <a:endParaRPr lang="en-US" dirty="0" smtClean="0"/>
+          </a:p>
+          <a:p>
+            <a:r>
+              <a:rPr lang="en-US" dirty="0"/>
+              <a:t>	</a:t>
+            </a:r>
+            <a:r>
+              <a:rPr lang="en-US" dirty="0" smtClean="0"/>
+              <a:t>ANS. Not move at all.</a:t>
+            </a:r>
+            <a:endParaRPr lang="en-US" dirty="0" smtClean="0"/>
+          </a:p>
+          <a:p>
+            <a:endParaRPr lang="en-US" dirty="0" smtClean="0"/>
+          </a:p>
+          <a:p>
+            <a:r>
+              <a:rPr lang="en-US" dirty="0" smtClean="0"/>
+              <a:t>What does Motor Off do?</a:t>
+            </a:r>
+          </a:p>
+        </p:txBody>
+      </p:sp>
       <p:pic>
         <p:nvPicPr>
-          <p:cNvPr id="13" name="Picture 12"/>
+          <p:cNvPr id="8" name="Picture 7"/>
           <p:cNvPicPr>
             <a:picLocks noChangeAspect="1"/>
           </p:cNvPicPr>
@@ -8977,7 +9199,7 @@
         </p:blipFill>
         <p:spPr>
           <a:xfrm>
-            <a:off x="6567858" y="2114580"/>
+            <a:off x="5962952" y="1531006"/>
             <a:ext cx="2191430" cy="1517144"/>
           </a:xfrm>
           <a:prstGeom prst="rect">
@@ -8987,120 +9209,13 @@
       </p:pic>
       <p:sp>
         <p:nvSpPr>
-          <p:cNvPr id="2" name="Title 1"/>
-          <p:cNvSpPr>
-            <a:spLocks noGrp="1"/>
-          </p:cNvSpPr>
-          <p:nvPr>
-            <p:ph type="title"/>
-          </p:nvPr>
+          <p:cNvPr id="9" name="Oval 8"/>
+          <p:cNvSpPr/>
+          <p:nvPr/>
         </p:nvSpPr>
         <p:spPr>
           <a:xfrm>
-            <a:off x="457200" y="152718"/>
-            <a:ext cx="8245475" cy="1371600"/>
-          </a:xfrm>
-        </p:spPr>
-        <p:txBody>
-          <a:bodyPr/>
-          <a:lstStyle/>
-          <a:p>
-            <a:r>
-              <a:rPr lang="en-US" dirty="0" smtClean="0"/>
-              <a:t>A tip for Move Steering Blocks With Sensors </a:t>
-            </a:r>
-            <a:endParaRPr lang="en-US" dirty="0"/>
-          </a:p>
-        </p:txBody>
-      </p:sp>
-      <p:sp>
-        <p:nvSpPr>
-          <p:cNvPr id="3" name="Content Placeholder 2"/>
-          <p:cNvSpPr>
-            <a:spLocks noGrp="1"/>
-          </p:cNvSpPr>
-          <p:nvPr>
-            <p:ph idx="1"/>
-          </p:nvPr>
-        </p:nvSpPr>
-        <p:spPr>
-          <a:xfrm>
-            <a:off x="457200" y="1549207"/>
-            <a:ext cx="5505752" cy="4525963"/>
-          </a:xfrm>
-        </p:spPr>
-        <p:txBody>
-          <a:bodyPr>
-            <a:normAutofit/>
-          </a:bodyPr>
-          <a:lstStyle/>
-          <a:p>
-            <a:r>
-              <a:rPr lang="en-US" dirty="0" smtClean="0"/>
-              <a:t>Leaving the motor “on” and “off”</a:t>
-            </a:r>
-          </a:p>
-          <a:p>
-            <a:r>
-              <a:rPr lang="en-US" dirty="0" smtClean="0"/>
-              <a:t>Why use the “on” instead of “degrees”?</a:t>
-            </a:r>
-          </a:p>
-          <a:p>
-            <a:pPr lvl="1"/>
-            <a:r>
-              <a:rPr lang="en-US" dirty="0" smtClean="0"/>
-              <a:t>May want the program to do other tasks such as reading a sensor while moving</a:t>
-            </a:r>
-          </a:p>
-          <a:p>
-            <a:endParaRPr lang="en-US" dirty="0"/>
-          </a:p>
-          <a:p>
-            <a:pPr lvl="1"/>
-            <a:endParaRPr lang="en-US" dirty="0" smtClean="0"/>
-          </a:p>
-        </p:txBody>
-      </p:sp>
-      <p:pic>
-        <p:nvPicPr>
-          <p:cNvPr id="8" name="Picture 7" descr="Screen Shot 2014-08-07 at 12.29.41 PM.png"/>
-          <p:cNvPicPr>
-            <a:picLocks noChangeAspect="1"/>
-          </p:cNvPicPr>
-          <p:nvPr/>
-        </p:nvPicPr>
-        <p:blipFill>
-          <a:blip r:embed="rId3">
-            <a:extLst>
-              <a:ext uri="{28A0092B-C50C-407E-A947-70E740481C1C}">
-                <a14:useLocalDpi xmlns:a14="http://schemas.microsoft.com/office/drawing/2010/main" val="0"/>
-              </a:ext>
-            </a:extLst>
-          </a:blip>
-          <a:stretch>
-            <a:fillRect/>
-          </a:stretch>
-        </p:blipFill>
-        <p:spPr>
-          <a:xfrm>
-            <a:off x="5634170" y="1437817"/>
-            <a:ext cx="3145906" cy="390733"/>
-          </a:xfrm>
-          <a:prstGeom prst="rect">
-            <a:avLst/>
-          </a:prstGeom>
-        </p:spPr>
-      </p:pic>
-      <p:sp>
-        <p:nvSpPr>
-          <p:cNvPr id="10" name="Oval 9"/>
-          <p:cNvSpPr/>
-          <p:nvPr/>
-        </p:nvSpPr>
-        <p:spPr>
-          <a:xfrm>
-            <a:off x="6677793" y="3097936"/>
+            <a:off x="6072887" y="2514362"/>
             <a:ext cx="667262" cy="629478"/>
           </a:xfrm>
           <a:prstGeom prst="ellipse">
@@ -9136,56 +9251,10 @@
           </a:p>
         </p:txBody>
       </p:sp>
-      <p:sp>
-        <p:nvSpPr>
-          <p:cNvPr id="11" name="Footer Placeholder 10"/>
-          <p:cNvSpPr>
-            <a:spLocks noGrp="1"/>
-          </p:cNvSpPr>
-          <p:nvPr>
-            <p:ph type="ftr" sz="quarter" idx="11"/>
-          </p:nvPr>
-        </p:nvSpPr>
-        <p:spPr/>
-        <p:txBody>
-          <a:bodyPr/>
-          <a:lstStyle/>
-          <a:p>
-            <a:r>
-              <a:rPr lang="en-US" smtClean="0"/>
-              <a:t>© EV3Lessons.com, 2015, (Last edit: 2/26/15)</a:t>
-            </a:r>
-            <a:endParaRPr lang="en-US"/>
-          </a:p>
-        </p:txBody>
-      </p:sp>
-      <p:sp>
-        <p:nvSpPr>
-          <p:cNvPr id="15" name="Slide Number Placeholder 14"/>
-          <p:cNvSpPr>
-            <a:spLocks noGrp="1"/>
-          </p:cNvSpPr>
-          <p:nvPr>
-            <p:ph type="sldNum" sz="quarter" idx="12"/>
-          </p:nvPr>
-        </p:nvSpPr>
-        <p:spPr/>
-        <p:txBody>
-          <a:bodyPr/>
-          <a:lstStyle/>
-          <a:p>
-            <a:fld id="{4DBC7FC8-25FB-FC45-8177-2B991DA6778C}" type="slidenum">
-              <a:rPr lang="en-US" smtClean="0"/>
-              <a:t>7</a:t>
-            </a:fld>
-            <a:endParaRPr lang="en-US"/>
-          </a:p>
-        </p:txBody>
-      </p:sp>
     </p:spTree>
     <p:extLst>
       <p:ext uri="{BB962C8B-B14F-4D97-AF65-F5344CB8AC3E}">
-        <p14:creationId xmlns:p14="http://schemas.microsoft.com/office/powerpoint/2010/main" val="2304462827"/>
+        <p14:creationId xmlns:p14="http://schemas.microsoft.com/office/powerpoint/2010/main" val="1071746091"/>
       </p:ext>
     </p:extLst>
   </p:cSld>
@@ -9203,145 +9272,6 @@
 </file>
 
 <file path=ppt/slides/slide8.xml><?xml version="1.0" encoding="utf-8"?>
-<p:sld xmlns:a="http://schemas.openxmlformats.org/drawingml/2006/main" xmlns:r="http://schemas.openxmlformats.org/officeDocument/2006/relationships" xmlns:p="http://schemas.openxmlformats.org/presentationml/2006/main">
-  <p:cSld>
-    <p:spTree>
-      <p:nvGrpSpPr>
-        <p:cNvPr id="1" name=""/>
-        <p:cNvGrpSpPr/>
-        <p:nvPr/>
-      </p:nvGrpSpPr>
-      <p:grpSpPr>
-        <a:xfrm>
-          <a:off x="0" y="0"/>
-          <a:ext cx="0" cy="0"/>
-          <a:chOff x="0" y="0"/>
-          <a:chExt cx="0" cy="0"/>
-        </a:xfrm>
-      </p:grpSpPr>
-      <p:sp>
-        <p:nvSpPr>
-          <p:cNvPr id="2" name="Title 1"/>
-          <p:cNvSpPr>
-            <a:spLocks noGrp="1"/>
-          </p:cNvSpPr>
-          <p:nvPr>
-            <p:ph type="title"/>
-          </p:nvPr>
-        </p:nvSpPr>
-        <p:spPr/>
-        <p:txBody>
-          <a:bodyPr/>
-          <a:lstStyle/>
-          <a:p>
-            <a:r>
-              <a:rPr lang="en-US" dirty="0" smtClean="0"/>
-              <a:t>TEACHER INSTRUCTIONS</a:t>
-            </a:r>
-            <a:endParaRPr lang="en-US" dirty="0"/>
-          </a:p>
-        </p:txBody>
-      </p:sp>
-      <p:sp>
-        <p:nvSpPr>
-          <p:cNvPr id="3" name="Content Placeholder 2"/>
-          <p:cNvSpPr>
-            <a:spLocks noGrp="1"/>
-          </p:cNvSpPr>
-          <p:nvPr>
-            <p:ph idx="1"/>
-          </p:nvPr>
-        </p:nvSpPr>
-        <p:spPr>
-          <a:xfrm>
-            <a:off x="457199" y="1235364"/>
-            <a:ext cx="8245474" cy="4373563"/>
-          </a:xfrm>
-        </p:spPr>
-        <p:txBody>
-          <a:bodyPr/>
-          <a:lstStyle/>
-          <a:p>
-            <a:r>
-              <a:rPr lang="en-US" dirty="0" smtClean="0"/>
-              <a:t>Challenges are on slides 9 and 11</a:t>
-            </a:r>
-          </a:p>
-          <a:p>
-            <a:r>
-              <a:rPr lang="en-US" dirty="0" smtClean="0"/>
-              <a:t>Solutions to these challenges are on slides 10 and 12</a:t>
-            </a:r>
-          </a:p>
-          <a:p>
-            <a:r>
-              <a:rPr lang="en-US" dirty="0" smtClean="0"/>
-              <a:t>Discussion is on slide 13</a:t>
-            </a:r>
-            <a:endParaRPr lang="en-US" dirty="0"/>
-          </a:p>
-        </p:txBody>
-      </p:sp>
-      <p:sp>
-        <p:nvSpPr>
-          <p:cNvPr id="4" name="Footer Placeholder 3"/>
-          <p:cNvSpPr>
-            <a:spLocks noGrp="1"/>
-          </p:cNvSpPr>
-          <p:nvPr>
-            <p:ph type="ftr" sz="quarter" idx="11"/>
-          </p:nvPr>
-        </p:nvSpPr>
-        <p:spPr/>
-        <p:txBody>
-          <a:bodyPr/>
-          <a:lstStyle/>
-          <a:p>
-            <a:r>
-              <a:rPr lang="en-US" smtClean="0"/>
-              <a:t>© EV3Lessons.com, 2015, (Last edit: 2/26/15)</a:t>
-            </a:r>
-            <a:endParaRPr lang="en-US"/>
-          </a:p>
-        </p:txBody>
-      </p:sp>
-      <p:sp>
-        <p:nvSpPr>
-          <p:cNvPr id="5" name="Slide Number Placeholder 4"/>
-          <p:cNvSpPr>
-            <a:spLocks noGrp="1"/>
-          </p:cNvSpPr>
-          <p:nvPr>
-            <p:ph type="sldNum" sz="quarter" idx="12"/>
-          </p:nvPr>
-        </p:nvSpPr>
-        <p:spPr/>
-        <p:txBody>
-          <a:bodyPr/>
-          <a:lstStyle/>
-          <a:p>
-            <a:fld id="{4DBC7FC8-25FB-FC45-8177-2B991DA6778C}" type="slidenum">
-              <a:rPr lang="en-US" smtClean="0"/>
-              <a:t>8</a:t>
-            </a:fld>
-            <a:endParaRPr lang="en-US"/>
-          </a:p>
-        </p:txBody>
-      </p:sp>
-    </p:spTree>
-    <p:extLst>
-      <p:ext uri="{BB962C8B-B14F-4D97-AF65-F5344CB8AC3E}">
-        <p14:creationId xmlns:p14="http://schemas.microsoft.com/office/powerpoint/2010/main" val="458274080"/>
-      </p:ext>
-    </p:extLst>
-  </p:cSld>
-  <p:clrMapOvr>
-    <a:masterClrMapping/>
-  </p:clrMapOvr>
-</p:sld>
-</file>
-
-<file path=ppt/slides/slide9.xml><?xml version="1.0" encoding="utf-8"?>
 <p:sld xmlns:a="http://schemas.openxmlformats.org/drawingml/2006/main" xmlns:r="http://schemas.openxmlformats.org/officeDocument/2006/relationships" xmlns:p="http://schemas.openxmlformats.org/presentationml/2006/main">
   <p:cSld>
     <p:spTree>
@@ -9639,7 +9569,7 @@
           <a:p>
             <a:fld id="{4DBC7FC8-25FB-FC45-8177-2B991DA6778C}" type="slidenum">
               <a:rPr lang="en-US" smtClean="0"/>
-              <a:t>9</a:t>
+              <a:t>8</a:t>
             </a:fld>
             <a:endParaRPr lang="en-US"/>
           </a:p>
@@ -9662,7 +9592,7 @@
           <a:p>
             <a:r>
               <a:rPr lang="en-US" smtClean="0"/>
-              <a:t>© EV3Lessons.com, 2015, (Last edit: 2/26/15)</a:t>
+              <a:t>© EV3Lessons.com, 2015, (Last edit: 11/01/15)</a:t>
             </a:r>
             <a:endParaRPr lang="en-US"/>
           </a:p>
@@ -10009,7 +9939,7 @@
           <a:noFill/>
           <a:extLst>
             <a:ext uri="{909E8E84-426E-40dd-AFC4-6F175D3DCCD1}">
-              <a14:hiddenFill xmlns:a14="http://schemas.microsoft.com/office/drawing/2010/main" xmlns="">
+              <a14:hiddenFill xmlns="" xmlns:a14="http://schemas.microsoft.com/office/drawing/2010/main">
                 <a:solidFill>
                   <a:srgbClr val="FFFFFF"/>
                 </a:solidFill>
@@ -10035,6 +9965,152 @@
       </p:par>
     </p:tnLst>
   </p:timing>
+</p:sld>
+</file>
+
+<file path=ppt/slides/slide9.xml><?xml version="1.0" encoding="utf-8"?>
+<p:sld xmlns:a="http://schemas.openxmlformats.org/drawingml/2006/main" xmlns:r="http://schemas.openxmlformats.org/officeDocument/2006/relationships" xmlns:p="http://schemas.openxmlformats.org/presentationml/2006/main">
+  <p:cSld>
+    <p:spTree>
+      <p:nvGrpSpPr>
+        <p:cNvPr id="1" name=""/>
+        <p:cNvGrpSpPr/>
+        <p:nvPr/>
+      </p:nvGrpSpPr>
+      <p:grpSpPr>
+        <a:xfrm>
+          <a:off x="0" y="0"/>
+          <a:ext cx="0" cy="0"/>
+          <a:chOff x="0" y="0"/>
+          <a:chExt cx="0" cy="0"/>
+        </a:xfrm>
+      </p:grpSpPr>
+      <p:sp>
+        <p:nvSpPr>
+          <p:cNvPr id="2" name="Title 1"/>
+          <p:cNvSpPr>
+            <a:spLocks noGrp="1"/>
+          </p:cNvSpPr>
+          <p:nvPr>
+            <p:ph type="title"/>
+          </p:nvPr>
+        </p:nvSpPr>
+        <p:spPr/>
+        <p:txBody>
+          <a:bodyPr/>
+          <a:lstStyle/>
+          <a:p>
+            <a:r>
+              <a:rPr lang="en-US" dirty="0" smtClean="0"/>
+              <a:t>Challenge 1 Solution</a:t>
+            </a:r>
+            <a:endParaRPr lang="en-US" dirty="0"/>
+          </a:p>
+        </p:txBody>
+      </p:sp>
+      <p:sp>
+        <p:nvSpPr>
+          <p:cNvPr id="3" name="Content Placeholder 2"/>
+          <p:cNvSpPr>
+            <a:spLocks noGrp="1"/>
+          </p:cNvSpPr>
+          <p:nvPr>
+            <p:ph idx="1"/>
+          </p:nvPr>
+        </p:nvSpPr>
+        <p:spPr/>
+        <p:txBody>
+          <a:bodyPr/>
+          <a:lstStyle/>
+          <a:p>
+            <a:r>
+              <a:rPr lang="en-US" dirty="0" smtClean="0"/>
+              <a:t>Add screenshot</a:t>
+            </a:r>
+            <a:endParaRPr lang="en-US" dirty="0"/>
+          </a:p>
+        </p:txBody>
+      </p:sp>
+      <p:sp>
+        <p:nvSpPr>
+          <p:cNvPr id="4" name="Slide Number Placeholder 3"/>
+          <p:cNvSpPr>
+            <a:spLocks noGrp="1"/>
+          </p:cNvSpPr>
+          <p:nvPr>
+            <p:ph type="sldNum" sz="quarter" idx="12"/>
+          </p:nvPr>
+        </p:nvSpPr>
+        <p:spPr/>
+        <p:txBody>
+          <a:bodyPr/>
+          <a:lstStyle/>
+          <a:p>
+            <a:fld id="{4DBC7FC8-25FB-FC45-8177-2B991DA6778C}" type="slidenum">
+              <a:rPr lang="en-US" smtClean="0"/>
+              <a:t>9</a:t>
+            </a:fld>
+            <a:endParaRPr lang="en-US"/>
+          </a:p>
+        </p:txBody>
+      </p:sp>
+      <p:sp>
+        <p:nvSpPr>
+          <p:cNvPr id="6" name="Footer Placeholder 5"/>
+          <p:cNvSpPr>
+            <a:spLocks noGrp="1"/>
+          </p:cNvSpPr>
+          <p:nvPr>
+            <p:ph type="ftr" sz="quarter" idx="11"/>
+          </p:nvPr>
+        </p:nvSpPr>
+        <p:spPr/>
+        <p:txBody>
+          <a:bodyPr/>
+          <a:lstStyle/>
+          <a:p>
+            <a:r>
+              <a:rPr lang="en-US" smtClean="0"/>
+              <a:t>© EV3Lessons.com, 2015, (Last edit: 11/01/15)</a:t>
+            </a:r>
+            <a:endParaRPr lang="en-US"/>
+          </a:p>
+        </p:txBody>
+      </p:sp>
+      <p:pic>
+        <p:nvPicPr>
+          <p:cNvPr id="7" name="Picture 6"/>
+          <p:cNvPicPr>
+            <a:picLocks noChangeAspect="1"/>
+          </p:cNvPicPr>
+          <p:nvPr/>
+        </p:nvPicPr>
+        <p:blipFill>
+          <a:blip r:embed="rId2"/>
+          <a:stretch>
+            <a:fillRect/>
+          </a:stretch>
+        </p:blipFill>
+        <p:spPr>
+          <a:xfrm>
+            <a:off x="333088" y="1121023"/>
+            <a:ext cx="7620946" cy="4828085"/>
+          </a:xfrm>
+          <a:prstGeom prst="rect">
+            <a:avLst/>
+          </a:prstGeom>
+        </p:spPr>
+      </p:pic>
+    </p:spTree>
+    <p:extLst>
+      <p:ext uri="{BB962C8B-B14F-4D97-AF65-F5344CB8AC3E}">
+        <p14:creationId xmlns:p14="http://schemas.microsoft.com/office/powerpoint/2010/main" val="774892794"/>
+      </p:ext>
+    </p:extLst>
+  </p:cSld>
+  <p:clrMapOvr>
+    <a:masterClrMapping/>
+  </p:clrMapOvr>
 </p:sld>
 </file>
 

</xml_diff>